<commit_message>
MOD| README.md| Add project description
</commit_message>
<xml_diff>
--- a/design_architecture_v02.pptx
+++ b/design_architecture_v02.pptx
@@ -40262,7 +40262,7 @@
             <p:spPr>
               <a:xfrm>
                 <a:off x="438839" y="4389120"/>
-                <a:ext cx="5321880" cy="788040"/>
+                <a:ext cx="2545803" cy="341332"/>
               </a:xfrm>
               <a:prstGeom prst="rect">
                 <a:avLst/>
@@ -40309,7 +40309,21 @@
                     <a:ea typeface="DejaVu Sans" pitchFamily="2"/>
                     <a:cs typeface="DejaVu Sans" pitchFamily="2"/>
                   </a:rPr>
-                  <a:t>Ask questions and get answers</a:t>
+                  <a:t>Ask options </a:t>
+                </a:r>
+                <a:r>
+                  <a:rPr lang="en-US" sz="1600" b="0" i="0" u="none" strike="noStrike" kern="1200" cap="none" dirty="0">
+                    <a:ln>
+                      <a:noFill/>
+                    </a:ln>
+                    <a:solidFill>
+                      <a:srgbClr val="FFFFFF"/>
+                    </a:solidFill>
+                    <a:latin typeface="Pothana2000" pitchFamily="18"/>
+                    <a:ea typeface="DejaVu Sans" pitchFamily="2"/>
+                    <a:cs typeface="DejaVu Sans" pitchFamily="2"/>
+                  </a:rPr>
+                  <a:t>and get answers</a:t>
                 </a:r>
               </a:p>
             </p:txBody>

</xml_diff>